<commit_message>
update notes on DBconnect
</commit_message>
<xml_diff>
--- a/Week2/day1/02_Day 1.pptx
+++ b/Week2/day1/02_Day 1.pptx
@@ -396,7 +396,7 @@
             <a:fld id="{AFDBD7A1-45CC-4C3E-98EA-CAFCA2FBBE13}" type="datetimeFigureOut">
               <a:rPr lang="en-US" smtClean="0"/>
               <a:pPr/>
-              <a:t>6/10/2022</a:t>
+              <a:t>6/13/2022</a:t>
             </a:fld>
             <a:endParaRPr lang="en-IN"/>
           </a:p>
@@ -584,7 +584,7 @@
             <a:fld id="{AFDBD7A1-45CC-4C3E-98EA-CAFCA2FBBE13}" type="datetimeFigureOut">
               <a:rPr lang="en-US" smtClean="0"/>
               <a:pPr/>
-              <a:t>6/10/2022</a:t>
+              <a:t>6/13/2022</a:t>
             </a:fld>
             <a:endParaRPr lang="en-IN"/>
           </a:p>
@@ -760,7 +760,7 @@
             <a:fld id="{AFDBD7A1-45CC-4C3E-98EA-CAFCA2FBBE13}" type="datetimeFigureOut">
               <a:rPr lang="en-US" smtClean="0"/>
               <a:pPr/>
-              <a:t>6/10/2022</a:t>
+              <a:t>6/13/2022</a:t>
             </a:fld>
             <a:endParaRPr lang="en-IN"/>
           </a:p>
@@ -941,7 +941,7 @@
             <a:fld id="{AFDBD7A1-45CC-4C3E-98EA-CAFCA2FBBE13}" type="datetimeFigureOut">
               <a:rPr lang="en-US" smtClean="0"/>
               <a:pPr/>
-              <a:t>6/10/2022</a:t>
+              <a:t>6/13/2022</a:t>
             </a:fld>
             <a:endParaRPr lang="en-IN"/>
           </a:p>
@@ -1190,7 +1190,7 @@
             <a:fld id="{AFDBD7A1-45CC-4C3E-98EA-CAFCA2FBBE13}" type="datetimeFigureOut">
               <a:rPr lang="en-US" smtClean="0"/>
               <a:pPr/>
-              <a:t>6/10/2022</a:t>
+              <a:t>6/13/2022</a:t>
             </a:fld>
             <a:endParaRPr lang="en-IN"/>
           </a:p>
@@ -1664,7 +1664,7 @@
             <a:fld id="{AFDBD7A1-45CC-4C3E-98EA-CAFCA2FBBE13}" type="datetimeFigureOut">
               <a:rPr lang="en-US" smtClean="0"/>
               <a:pPr/>
-              <a:t>6/10/2022</a:t>
+              <a:t>6/13/2022</a:t>
             </a:fld>
             <a:endParaRPr lang="en-IN"/>
           </a:p>
@@ -2080,7 +2080,7 @@
             <a:fld id="{AFDBD7A1-45CC-4C3E-98EA-CAFCA2FBBE13}" type="datetimeFigureOut">
               <a:rPr lang="en-US" smtClean="0"/>
               <a:pPr/>
-              <a:t>6/10/2022</a:t>
+              <a:t>6/13/2022</a:t>
             </a:fld>
             <a:endParaRPr lang="en-IN"/>
           </a:p>
@@ -2212,7 +2212,7 @@
             <a:fld id="{AFDBD7A1-45CC-4C3E-98EA-CAFCA2FBBE13}" type="datetimeFigureOut">
               <a:rPr lang="en-US" smtClean="0"/>
               <a:pPr/>
-              <a:t>6/10/2022</a:t>
+              <a:t>6/13/2022</a:t>
             </a:fld>
             <a:endParaRPr lang="en-IN"/>
           </a:p>
@@ -2309,7 +2309,7 @@
             <a:fld id="{AFDBD7A1-45CC-4C3E-98EA-CAFCA2FBBE13}" type="datetimeFigureOut">
               <a:rPr lang="en-US" smtClean="0"/>
               <a:pPr/>
-              <a:t>6/10/2022</a:t>
+              <a:t>6/13/2022</a:t>
             </a:fld>
             <a:endParaRPr lang="en-IN"/>
           </a:p>
@@ -2588,7 +2588,7 @@
             <a:fld id="{AFDBD7A1-45CC-4C3E-98EA-CAFCA2FBBE13}" type="datetimeFigureOut">
               <a:rPr lang="en-US" smtClean="0"/>
               <a:pPr/>
-              <a:t>6/10/2022</a:t>
+              <a:t>6/13/2022</a:t>
             </a:fld>
             <a:endParaRPr lang="en-IN"/>
           </a:p>
@@ -2841,7 +2841,7 @@
             <a:fld id="{AFDBD7A1-45CC-4C3E-98EA-CAFCA2FBBE13}" type="datetimeFigureOut">
               <a:rPr lang="en-US" smtClean="0"/>
               <a:pPr/>
-              <a:t>6/10/2022</a:t>
+              <a:t>6/13/2022</a:t>
             </a:fld>
             <a:endParaRPr lang="en-IN"/>
           </a:p>
@@ -3213,7 +3213,7 @@
             <a:fld id="{AFDBD7A1-45CC-4C3E-98EA-CAFCA2FBBE13}" type="datetimeFigureOut">
               <a:rPr lang="en-US" smtClean="0"/>
               <a:pPr/>
-              <a:t>6/10/2022</a:t>
+              <a:t>6/13/2022</a:t>
             </a:fld>
             <a:endParaRPr lang="en-IN"/>
           </a:p>
@@ -4073,7 +4073,7 @@
                 <a:latin typeface="Arabic Typesetting" pitchFamily="66" charset="-78"/>
                 <a:cs typeface="Arabic Typesetting" pitchFamily="66" charset="-78"/>
               </a:rPr>
-              <a:t>CREATE TABLE EMPLOYEE(Name VARCHAR2(20), Email VARCHAR2(100), DOB DATE); </a:t>
+              <a:t>CREATE TABLE EMPLOYEE(Name VARCHAR(20), Email VARCHAR(100), DOB DATE); </a:t>
             </a:r>
             <a:r>
               <a:rPr lang="en-IN" sz="2800" dirty="0">
@@ -4418,7 +4418,7 @@
                 <a:latin typeface="Arabic Typesetting" pitchFamily="66" charset="-78"/>
                 <a:cs typeface="Arabic Typesetting" pitchFamily="66" charset="-78"/>
               </a:rPr>
-              <a:t>ALTER TABLE STU_DETAILS ADD(ADDRESS VARCHAR2(20));  </a:t>
+              <a:t>ALTER TABLE STU_DETAILS ADD(ADDRESS VARCHAR(20));  </a:t>
             </a:r>
           </a:p>
           <a:p>
@@ -4430,7 +4430,7 @@
                 <a:latin typeface="Arabic Typesetting" pitchFamily="66" charset="-78"/>
                 <a:cs typeface="Arabic Typesetting" pitchFamily="66" charset="-78"/>
               </a:rPr>
-              <a:t>		ALTER TABLE STU_DETAILS MODIFY (NAME VARCHAR2(20));  </a:t>
+              <a:t>		ALTER TABLE STU_DETAILS MODIFY (NAME VARCHAR(20));  </a:t>
             </a:r>
           </a:p>
           <a:p>

</xml_diff>